<commit_message>
current work, SESAR mapping
</commit_message>
<xml_diff>
--- a/vocabulary/MaterialTypeDecisionTree.pptx
+++ b/vocabulary/MaterialTypeDecisionTree.pptx
@@ -2,12 +2,12 @@
 <file path=ppt/presentation.xml><?xml version="1.0" encoding="utf-8"?>
 <p:presentation xmlns:a="http://schemas.openxmlformats.org/drawingml/2006/main" xmlns:r="http://schemas.openxmlformats.org/officeDocument/2006/relationships" xmlns:p="http://schemas.openxmlformats.org/presentationml/2006/main" saveSubsetFonts="1">
   <p:sldMasterIdLst>
-    <p:sldMasterId id="2147483660" r:id="rId1"/>
+    <p:sldMasterId id="2147483672" r:id="rId1"/>
   </p:sldMasterIdLst>
   <p:sldIdLst>
     <p:sldId id="256" r:id="rId2"/>
   </p:sldIdLst>
-  <p:sldSz cx="12192000" cy="10972800"/>
+  <p:sldSz cx="12192000" cy="12801600"/>
   <p:notesSz cx="6858000" cy="9144000"/>
   <p:defaultTextStyle>
     <a:defPPr>
@@ -141,8 +141,8 @@
         </p:nvSpPr>
         <p:spPr>
           <a:xfrm>
-            <a:off x="914400" y="1795781"/>
-            <a:ext cx="10363200" cy="3820160"/>
+            <a:off x="914400" y="2095078"/>
+            <a:ext cx="10363200" cy="4456853"/>
           </a:xfrm>
         </p:spPr>
         <p:txBody>
@@ -173,8 +173,8 @@
         </p:nvSpPr>
         <p:spPr>
           <a:xfrm>
-            <a:off x="1524000" y="5763261"/>
-            <a:ext cx="9144000" cy="2649219"/>
+            <a:off x="1524000" y="6723804"/>
+            <a:ext cx="9144000" cy="3090756"/>
           </a:xfrm>
         </p:spPr>
         <p:txBody>
@@ -243,7 +243,7 @@
           <a:p>
             <a:fld id="{1956BE6B-EBDA-47AD-B12E-4D406315FF98}" type="datetimeFigureOut">
               <a:rPr lang="en-US" smtClean="0"/>
-              <a:t>3/25/2021</a:t>
+              <a:t>4/21/2021</a:t>
             </a:fld>
             <a:endParaRPr lang="en-US"/>
           </a:p>
@@ -294,7 +294,7 @@
     </p:spTree>
     <p:extLst>
       <p:ext uri="{BB962C8B-B14F-4D97-AF65-F5344CB8AC3E}">
-        <p14:creationId xmlns:p14="http://schemas.microsoft.com/office/powerpoint/2010/main" val="3517477572"/>
+        <p14:creationId xmlns:p14="http://schemas.microsoft.com/office/powerpoint/2010/main" val="1611406571"/>
       </p:ext>
     </p:extLst>
   </p:cSld>
@@ -413,7 +413,7 @@
           <a:p>
             <a:fld id="{1956BE6B-EBDA-47AD-B12E-4D406315FF98}" type="datetimeFigureOut">
               <a:rPr lang="en-US" smtClean="0"/>
-              <a:t>3/25/2021</a:t>
+              <a:t>4/21/2021</a:t>
             </a:fld>
             <a:endParaRPr lang="en-US"/>
           </a:p>
@@ -464,7 +464,7 @@
     </p:spTree>
     <p:extLst>
       <p:ext uri="{BB962C8B-B14F-4D97-AF65-F5344CB8AC3E}">
-        <p14:creationId xmlns:p14="http://schemas.microsoft.com/office/powerpoint/2010/main" val="1386819310"/>
+        <p14:creationId xmlns:p14="http://schemas.microsoft.com/office/powerpoint/2010/main" val="2564642808"/>
       </p:ext>
     </p:extLst>
   </p:cSld>
@@ -503,8 +503,8 @@
         </p:nvSpPr>
         <p:spPr>
           <a:xfrm>
-            <a:off x="8724901" y="584200"/>
-            <a:ext cx="2628900" cy="9298941"/>
+            <a:off x="8724901" y="681567"/>
+            <a:ext cx="2628900" cy="10848764"/>
           </a:xfrm>
         </p:spPr>
         <p:txBody>
@@ -531,8 +531,8 @@
         </p:nvSpPr>
         <p:spPr>
           <a:xfrm>
-            <a:off x="838201" y="584200"/>
-            <a:ext cx="7734300" cy="9298941"/>
+            <a:off x="838201" y="681567"/>
+            <a:ext cx="7734300" cy="10848764"/>
           </a:xfrm>
         </p:spPr>
         <p:txBody>
@@ -593,7 +593,7 @@
           <a:p>
             <a:fld id="{1956BE6B-EBDA-47AD-B12E-4D406315FF98}" type="datetimeFigureOut">
               <a:rPr lang="en-US" smtClean="0"/>
-              <a:t>3/25/2021</a:t>
+              <a:t>4/21/2021</a:t>
             </a:fld>
             <a:endParaRPr lang="en-US"/>
           </a:p>
@@ -644,7 +644,7 @@
     </p:spTree>
     <p:extLst>
       <p:ext uri="{BB962C8B-B14F-4D97-AF65-F5344CB8AC3E}">
-        <p14:creationId xmlns:p14="http://schemas.microsoft.com/office/powerpoint/2010/main" val="2427567241"/>
+        <p14:creationId xmlns:p14="http://schemas.microsoft.com/office/powerpoint/2010/main" val="2023413533"/>
       </p:ext>
     </p:extLst>
   </p:cSld>
@@ -763,7 +763,7 @@
           <a:p>
             <a:fld id="{1956BE6B-EBDA-47AD-B12E-4D406315FF98}" type="datetimeFigureOut">
               <a:rPr lang="en-US" smtClean="0"/>
-              <a:t>3/25/2021</a:t>
+              <a:t>4/21/2021</a:t>
             </a:fld>
             <a:endParaRPr lang="en-US"/>
           </a:p>
@@ -814,7 +814,7 @@
     </p:spTree>
     <p:extLst>
       <p:ext uri="{BB962C8B-B14F-4D97-AF65-F5344CB8AC3E}">
-        <p14:creationId xmlns:p14="http://schemas.microsoft.com/office/powerpoint/2010/main" val="629169812"/>
+        <p14:creationId xmlns:p14="http://schemas.microsoft.com/office/powerpoint/2010/main" val="3517243820"/>
       </p:ext>
     </p:extLst>
   </p:cSld>
@@ -853,8 +853,8 @@
         </p:nvSpPr>
         <p:spPr>
           <a:xfrm>
-            <a:off x="831851" y="2735583"/>
-            <a:ext cx="10515600" cy="4564379"/>
+            <a:off x="831851" y="3191514"/>
+            <a:ext cx="10515600" cy="5325109"/>
           </a:xfrm>
         </p:spPr>
         <p:txBody>
@@ -885,8 +885,8 @@
         </p:nvSpPr>
         <p:spPr>
           <a:xfrm>
-            <a:off x="831851" y="7343143"/>
-            <a:ext cx="10515600" cy="2400299"/>
+            <a:off x="831851" y="8567000"/>
+            <a:ext cx="10515600" cy="2800349"/>
           </a:xfrm>
         </p:spPr>
         <p:txBody>
@@ -1007,7 +1007,7 @@
           <a:p>
             <a:fld id="{1956BE6B-EBDA-47AD-B12E-4D406315FF98}" type="datetimeFigureOut">
               <a:rPr lang="en-US" smtClean="0"/>
-              <a:t>3/25/2021</a:t>
+              <a:t>4/21/2021</a:t>
             </a:fld>
             <a:endParaRPr lang="en-US"/>
           </a:p>
@@ -1058,7 +1058,7 @@
     </p:spTree>
     <p:extLst>
       <p:ext uri="{BB962C8B-B14F-4D97-AF65-F5344CB8AC3E}">
-        <p14:creationId xmlns:p14="http://schemas.microsoft.com/office/powerpoint/2010/main" val="1396608424"/>
+        <p14:creationId xmlns:p14="http://schemas.microsoft.com/office/powerpoint/2010/main" val="2653136369"/>
       </p:ext>
     </p:extLst>
   </p:cSld>
@@ -1120,8 +1120,8 @@
         </p:nvSpPr>
         <p:spPr>
           <a:xfrm>
-            <a:off x="838200" y="2921000"/>
-            <a:ext cx="5181600" cy="6962141"/>
+            <a:off x="838200" y="3407833"/>
+            <a:ext cx="5181600" cy="8122498"/>
           </a:xfrm>
         </p:spPr>
         <p:txBody>
@@ -1177,8 +1177,8 @@
         </p:nvSpPr>
         <p:spPr>
           <a:xfrm>
-            <a:off x="6172200" y="2921000"/>
-            <a:ext cx="5181600" cy="6962141"/>
+            <a:off x="6172200" y="3407833"/>
+            <a:ext cx="5181600" cy="8122498"/>
           </a:xfrm>
         </p:spPr>
         <p:txBody>
@@ -1239,7 +1239,7 @@
           <a:p>
             <a:fld id="{1956BE6B-EBDA-47AD-B12E-4D406315FF98}" type="datetimeFigureOut">
               <a:rPr lang="en-US" smtClean="0"/>
-              <a:t>3/25/2021</a:t>
+              <a:t>4/21/2021</a:t>
             </a:fld>
             <a:endParaRPr lang="en-US"/>
           </a:p>
@@ -1290,7 +1290,7 @@
     </p:spTree>
     <p:extLst>
       <p:ext uri="{BB962C8B-B14F-4D97-AF65-F5344CB8AC3E}">
-        <p14:creationId xmlns:p14="http://schemas.microsoft.com/office/powerpoint/2010/main" val="1865363257"/>
+        <p14:creationId xmlns:p14="http://schemas.microsoft.com/office/powerpoint/2010/main" val="3362114171"/>
       </p:ext>
     </p:extLst>
   </p:cSld>
@@ -1329,8 +1329,8 @@
         </p:nvSpPr>
         <p:spPr>
           <a:xfrm>
-            <a:off x="839788" y="584202"/>
-            <a:ext cx="10515600" cy="2120901"/>
+            <a:off x="839788" y="681570"/>
+            <a:ext cx="10515600" cy="2474384"/>
           </a:xfrm>
         </p:spPr>
         <p:txBody>
@@ -1357,8 +1357,8 @@
         </p:nvSpPr>
         <p:spPr>
           <a:xfrm>
-            <a:off x="839789" y="2689861"/>
-            <a:ext cx="5157787" cy="1318259"/>
+            <a:off x="839789" y="3138171"/>
+            <a:ext cx="5157787" cy="1537969"/>
           </a:xfrm>
         </p:spPr>
         <p:txBody>
@@ -1422,8 +1422,8 @@
         </p:nvSpPr>
         <p:spPr>
           <a:xfrm>
-            <a:off x="839789" y="4008120"/>
-            <a:ext cx="5157787" cy="5895341"/>
+            <a:off x="839789" y="4676140"/>
+            <a:ext cx="5157787" cy="6877898"/>
           </a:xfrm>
         </p:spPr>
         <p:txBody>
@@ -1479,8 +1479,8 @@
         </p:nvSpPr>
         <p:spPr>
           <a:xfrm>
-            <a:off x="6172201" y="2689861"/>
-            <a:ext cx="5183188" cy="1318259"/>
+            <a:off x="6172201" y="3138171"/>
+            <a:ext cx="5183188" cy="1537969"/>
           </a:xfrm>
         </p:spPr>
         <p:txBody>
@@ -1544,8 +1544,8 @@
         </p:nvSpPr>
         <p:spPr>
           <a:xfrm>
-            <a:off x="6172201" y="4008120"/>
-            <a:ext cx="5183188" cy="5895341"/>
+            <a:off x="6172201" y="4676140"/>
+            <a:ext cx="5183188" cy="6877898"/>
           </a:xfrm>
         </p:spPr>
         <p:txBody>
@@ -1606,7 +1606,7 @@
           <a:p>
             <a:fld id="{1956BE6B-EBDA-47AD-B12E-4D406315FF98}" type="datetimeFigureOut">
               <a:rPr lang="en-US" smtClean="0"/>
-              <a:t>3/25/2021</a:t>
+              <a:t>4/21/2021</a:t>
             </a:fld>
             <a:endParaRPr lang="en-US"/>
           </a:p>
@@ -1657,7 +1657,7 @@
     </p:spTree>
     <p:extLst>
       <p:ext uri="{BB962C8B-B14F-4D97-AF65-F5344CB8AC3E}">
-        <p14:creationId xmlns:p14="http://schemas.microsoft.com/office/powerpoint/2010/main" val="1012020468"/>
+        <p14:creationId xmlns:p14="http://schemas.microsoft.com/office/powerpoint/2010/main" val="731920940"/>
       </p:ext>
     </p:extLst>
   </p:cSld>
@@ -1724,7 +1724,7 @@
           <a:p>
             <a:fld id="{1956BE6B-EBDA-47AD-B12E-4D406315FF98}" type="datetimeFigureOut">
               <a:rPr lang="en-US" smtClean="0"/>
-              <a:t>3/25/2021</a:t>
+              <a:t>4/21/2021</a:t>
             </a:fld>
             <a:endParaRPr lang="en-US"/>
           </a:p>
@@ -1775,7 +1775,7 @@
     </p:spTree>
     <p:extLst>
       <p:ext uri="{BB962C8B-B14F-4D97-AF65-F5344CB8AC3E}">
-        <p14:creationId xmlns:p14="http://schemas.microsoft.com/office/powerpoint/2010/main" val="4087563979"/>
+        <p14:creationId xmlns:p14="http://schemas.microsoft.com/office/powerpoint/2010/main" val="2713436737"/>
       </p:ext>
     </p:extLst>
   </p:cSld>
@@ -1819,7 +1819,7 @@
           <a:p>
             <a:fld id="{1956BE6B-EBDA-47AD-B12E-4D406315FF98}" type="datetimeFigureOut">
               <a:rPr lang="en-US" smtClean="0"/>
-              <a:t>3/25/2021</a:t>
+              <a:t>4/21/2021</a:t>
             </a:fld>
             <a:endParaRPr lang="en-US"/>
           </a:p>
@@ -1870,7 +1870,7 @@
     </p:spTree>
     <p:extLst>
       <p:ext uri="{BB962C8B-B14F-4D97-AF65-F5344CB8AC3E}">
-        <p14:creationId xmlns:p14="http://schemas.microsoft.com/office/powerpoint/2010/main" val="3050915734"/>
+        <p14:creationId xmlns:p14="http://schemas.microsoft.com/office/powerpoint/2010/main" val="3948580577"/>
       </p:ext>
     </p:extLst>
   </p:cSld>
@@ -1909,8 +1909,8 @@
         </p:nvSpPr>
         <p:spPr>
           <a:xfrm>
-            <a:off x="839788" y="731520"/>
-            <a:ext cx="3932237" cy="2560320"/>
+            <a:off x="839788" y="853440"/>
+            <a:ext cx="3932237" cy="2987040"/>
           </a:xfrm>
         </p:spPr>
         <p:txBody>
@@ -1941,8 +1941,8 @@
         </p:nvSpPr>
         <p:spPr>
           <a:xfrm>
-            <a:off x="5183188" y="1579882"/>
-            <a:ext cx="6172200" cy="7797800"/>
+            <a:off x="5183188" y="1843196"/>
+            <a:ext cx="6172200" cy="9097433"/>
           </a:xfrm>
         </p:spPr>
         <p:txBody>
@@ -2026,8 +2026,8 @@
         </p:nvSpPr>
         <p:spPr>
           <a:xfrm>
-            <a:off x="839788" y="3291840"/>
-            <a:ext cx="3932237" cy="6098541"/>
+            <a:off x="839788" y="3840480"/>
+            <a:ext cx="3932237" cy="7114964"/>
           </a:xfrm>
         </p:spPr>
         <p:txBody>
@@ -2096,7 +2096,7 @@
           <a:p>
             <a:fld id="{1956BE6B-EBDA-47AD-B12E-4D406315FF98}" type="datetimeFigureOut">
               <a:rPr lang="en-US" smtClean="0"/>
-              <a:t>3/25/2021</a:t>
+              <a:t>4/21/2021</a:t>
             </a:fld>
             <a:endParaRPr lang="en-US"/>
           </a:p>
@@ -2147,7 +2147,7 @@
     </p:spTree>
     <p:extLst>
       <p:ext uri="{BB962C8B-B14F-4D97-AF65-F5344CB8AC3E}">
-        <p14:creationId xmlns:p14="http://schemas.microsoft.com/office/powerpoint/2010/main" val="2358202477"/>
+        <p14:creationId xmlns:p14="http://schemas.microsoft.com/office/powerpoint/2010/main" val="1255614900"/>
       </p:ext>
     </p:extLst>
   </p:cSld>
@@ -2186,8 +2186,8 @@
         </p:nvSpPr>
         <p:spPr>
           <a:xfrm>
-            <a:off x="839788" y="731520"/>
-            <a:ext cx="3932237" cy="2560320"/>
+            <a:off x="839788" y="853440"/>
+            <a:ext cx="3932237" cy="2987040"/>
           </a:xfrm>
         </p:spPr>
         <p:txBody>
@@ -2218,8 +2218,8 @@
         </p:nvSpPr>
         <p:spPr>
           <a:xfrm>
-            <a:off x="5183188" y="1579882"/>
-            <a:ext cx="6172200" cy="7797800"/>
+            <a:off x="5183188" y="1843196"/>
+            <a:ext cx="6172200" cy="9097433"/>
           </a:xfrm>
         </p:spPr>
         <p:txBody>
@@ -2283,8 +2283,8 @@
         </p:nvSpPr>
         <p:spPr>
           <a:xfrm>
-            <a:off x="839788" y="3291840"/>
-            <a:ext cx="3932237" cy="6098541"/>
+            <a:off x="839788" y="3840480"/>
+            <a:ext cx="3932237" cy="7114964"/>
           </a:xfrm>
         </p:spPr>
         <p:txBody>
@@ -2353,7 +2353,7 @@
           <a:p>
             <a:fld id="{1956BE6B-EBDA-47AD-B12E-4D406315FF98}" type="datetimeFigureOut">
               <a:rPr lang="en-US" smtClean="0"/>
-              <a:t>3/25/2021</a:t>
+              <a:t>4/21/2021</a:t>
             </a:fld>
             <a:endParaRPr lang="en-US"/>
           </a:p>
@@ -2404,7 +2404,7 @@
     </p:spTree>
     <p:extLst>
       <p:ext uri="{BB962C8B-B14F-4D97-AF65-F5344CB8AC3E}">
-        <p14:creationId xmlns:p14="http://schemas.microsoft.com/office/powerpoint/2010/main" val="1189665671"/>
+        <p14:creationId xmlns:p14="http://schemas.microsoft.com/office/powerpoint/2010/main" val="2471540898"/>
       </p:ext>
     </p:extLst>
   </p:cSld>
@@ -2448,8 +2448,8 @@
         </p:nvSpPr>
         <p:spPr>
           <a:xfrm>
-            <a:off x="838200" y="584202"/>
-            <a:ext cx="10515600" cy="2120901"/>
+            <a:off x="838200" y="681570"/>
+            <a:ext cx="10515600" cy="2474384"/>
           </a:xfrm>
           <a:prstGeom prst="rect">
             <a:avLst/>
@@ -2481,8 +2481,8 @@
         </p:nvSpPr>
         <p:spPr>
           <a:xfrm>
-            <a:off x="838200" y="2921000"/>
-            <a:ext cx="10515600" cy="6962141"/>
+            <a:off x="838200" y="3407833"/>
+            <a:ext cx="10515600" cy="8122498"/>
           </a:xfrm>
           <a:prstGeom prst="rect">
             <a:avLst/>
@@ -2543,8 +2543,8 @@
         </p:nvSpPr>
         <p:spPr>
           <a:xfrm>
-            <a:off x="838200" y="10170162"/>
-            <a:ext cx="2743200" cy="584200"/>
+            <a:off x="838200" y="11865189"/>
+            <a:ext cx="2743200" cy="681567"/>
           </a:xfrm>
           <a:prstGeom prst="rect">
             <a:avLst/>
@@ -2566,7 +2566,7 @@
           <a:p>
             <a:fld id="{1956BE6B-EBDA-47AD-B12E-4D406315FF98}" type="datetimeFigureOut">
               <a:rPr lang="en-US" smtClean="0"/>
-              <a:t>3/25/2021</a:t>
+              <a:t>4/21/2021</a:t>
             </a:fld>
             <a:endParaRPr lang="en-US"/>
           </a:p>
@@ -2584,8 +2584,8 @@
         </p:nvSpPr>
         <p:spPr>
           <a:xfrm>
-            <a:off x="4038600" y="10170162"/>
-            <a:ext cx="4114800" cy="584200"/>
+            <a:off x="4038600" y="11865189"/>
+            <a:ext cx="4114800" cy="681567"/>
           </a:xfrm>
           <a:prstGeom prst="rect">
             <a:avLst/>
@@ -2621,8 +2621,8 @@
         </p:nvSpPr>
         <p:spPr>
           <a:xfrm>
-            <a:off x="8610600" y="10170162"/>
-            <a:ext cx="2743200" cy="584200"/>
+            <a:off x="8610600" y="11865189"/>
+            <a:ext cx="2743200" cy="681567"/>
           </a:xfrm>
           <a:prstGeom prst="rect">
             <a:avLst/>
@@ -2653,23 +2653,23 @@
     </p:spTree>
     <p:extLst>
       <p:ext uri="{BB962C8B-B14F-4D97-AF65-F5344CB8AC3E}">
-        <p14:creationId xmlns:p14="http://schemas.microsoft.com/office/powerpoint/2010/main" val="654189770"/>
+        <p14:creationId xmlns:p14="http://schemas.microsoft.com/office/powerpoint/2010/main" val="3223252602"/>
       </p:ext>
     </p:extLst>
   </p:cSld>
   <p:clrMap bg1="lt1" tx1="dk1" bg2="lt2" tx2="dk2" accent1="accent1" accent2="accent2" accent3="accent3" accent4="accent4" accent5="accent5" accent6="accent6" hlink="hlink" folHlink="folHlink"/>
   <p:sldLayoutIdLst>
-    <p:sldLayoutId id="2147483661" r:id="rId1"/>
-    <p:sldLayoutId id="2147483662" r:id="rId2"/>
-    <p:sldLayoutId id="2147483663" r:id="rId3"/>
-    <p:sldLayoutId id="2147483664" r:id="rId4"/>
-    <p:sldLayoutId id="2147483665" r:id="rId5"/>
-    <p:sldLayoutId id="2147483666" r:id="rId6"/>
-    <p:sldLayoutId id="2147483667" r:id="rId7"/>
-    <p:sldLayoutId id="2147483668" r:id="rId8"/>
-    <p:sldLayoutId id="2147483669" r:id="rId9"/>
-    <p:sldLayoutId id="2147483670" r:id="rId10"/>
-    <p:sldLayoutId id="2147483671" r:id="rId11"/>
+    <p:sldLayoutId id="2147483673" r:id="rId1"/>
+    <p:sldLayoutId id="2147483674" r:id="rId2"/>
+    <p:sldLayoutId id="2147483675" r:id="rId3"/>
+    <p:sldLayoutId id="2147483676" r:id="rId4"/>
+    <p:sldLayoutId id="2147483677" r:id="rId5"/>
+    <p:sldLayoutId id="2147483678" r:id="rId6"/>
+    <p:sldLayoutId id="2147483679" r:id="rId7"/>
+    <p:sldLayoutId id="2147483680" r:id="rId8"/>
+    <p:sldLayoutId id="2147483681" r:id="rId9"/>
+    <p:sldLayoutId id="2147483682" r:id="rId10"/>
+    <p:sldLayoutId id="2147483683" r:id="rId11"/>
   </p:sldLayoutIdLst>
   <p:txStyles>
     <p:titleStyle>
@@ -2985,8 +2985,8 @@
         </p:nvSpPr>
         <p:spPr>
           <a:xfrm>
-            <a:off x="6629454" y="521154"/>
-            <a:ext cx="3441608" cy="1386286"/>
+            <a:off x="3377943" y="740956"/>
+            <a:ext cx="4070307" cy="914399"/>
           </a:xfrm>
           <a:prstGeom prst="rect">
             <a:avLst/>
@@ -3020,18 +3020,13 @@
           <a:p>
             <a:pPr algn="ctr"/>
             <a:r>
-              <a:rPr lang="en-US">
+              <a:rPr lang="en-US" dirty="0">
                 <a:solidFill>
                   <a:schemeClr val="tx1"/>
                 </a:solidFill>
               </a:rPr>
-              <a:t>material derived from living organisms and composed primarily of one or more very large molecules of biological origin.</a:t>
-            </a:r>
-            <a:endParaRPr lang="en-US" dirty="0">
-              <a:solidFill>
-                <a:schemeClr val="tx1"/>
-              </a:solidFill>
-            </a:endParaRPr>
+              <a:t>Material derived from living organisms and composed primarily of one or more very large molecules of biological origin.</a:t>
+            </a:r>
           </a:p>
         </p:txBody>
       </p:sp>
@@ -3049,8 +3044,8 @@
         </p:nvSpPr>
         <p:spPr>
           <a:xfrm>
-            <a:off x="776154" y="891131"/>
-            <a:ext cx="1612817" cy="646331"/>
+            <a:off x="281800" y="631617"/>
+            <a:ext cx="1920317" cy="646331"/>
           </a:xfrm>
           <a:prstGeom prst="rect">
             <a:avLst/>
@@ -3089,7 +3084,7 @@
                   <a:schemeClr val="tx1"/>
                 </a:solidFill>
               </a:rPr>
-              <a:t>produced by human activity</a:t>
+              <a:t>Material produced by human activity</a:t>
             </a:r>
           </a:p>
         </p:txBody>
@@ -3108,7 +3103,7 @@
         </p:nvSpPr>
         <p:spPr>
           <a:xfrm>
-            <a:off x="1096722" y="1998013"/>
+            <a:off x="898196" y="2384912"/>
             <a:ext cx="1002736" cy="337872"/>
           </a:xfrm>
           <a:prstGeom prst="rect">
@@ -3167,8 +3162,8 @@
         </p:nvSpPr>
         <p:spPr>
           <a:xfrm>
-            <a:off x="3708355" y="659797"/>
-            <a:ext cx="1969476" cy="914399"/>
+            <a:off x="9064106" y="2765665"/>
+            <a:ext cx="2659240" cy="914399"/>
           </a:xfrm>
           <a:prstGeom prst="rect">
             <a:avLst/>
@@ -3207,7 +3202,7 @@
                   <a:schemeClr val="tx1"/>
                 </a:solidFill>
               </a:rPr>
-              <a:t>consists of two or more media that do not mix. </a:t>
+              <a:t>A single material that consists of two or more media that do not mix. </a:t>
             </a:r>
           </a:p>
         </p:txBody>
@@ -3230,8 +3225,8 @@
         </p:nvCxnSpPr>
         <p:spPr>
           <a:xfrm>
-            <a:off x="1598090" y="2335885"/>
-            <a:ext cx="336695" cy="426291"/>
+            <a:off x="1399564" y="2722784"/>
+            <a:ext cx="523042" cy="380346"/>
           </a:xfrm>
           <a:prstGeom prst="straightConnector1">
             <a:avLst/>
@@ -3271,14 +3266,14 @@
           <p:cNvCxnSpPr>
             <a:cxnSpLocks/>
             <a:stCxn id="6" idx="3"/>
-            <a:endCxn id="15" idx="1"/>
+            <a:endCxn id="4" idx="1"/>
           </p:cNvCxnSpPr>
           <p:nvPr/>
         </p:nvCxnSpPr>
         <p:spPr>
-          <a:xfrm flipV="1">
-            <a:off x="2388971" y="1116997"/>
-            <a:ext cx="1319384" cy="97300"/>
+          <a:xfrm>
+            <a:off x="2202117" y="954783"/>
+            <a:ext cx="1175826" cy="243373"/>
           </a:xfrm>
           <a:prstGeom prst="straightConnector1">
             <a:avLst/>
@@ -3318,15 +3313,15 @@
           </p:cNvPr>
           <p:cNvCxnSpPr>
             <a:cxnSpLocks/>
-            <a:stCxn id="15" idx="3"/>
-            <a:endCxn id="4" idx="1"/>
+            <a:stCxn id="107" idx="2"/>
+            <a:endCxn id="15" idx="0"/>
           </p:cNvCxnSpPr>
           <p:nvPr/>
         </p:nvCxnSpPr>
         <p:spPr>
           <a:xfrm>
-            <a:off x="5677831" y="1116997"/>
-            <a:ext cx="951623" cy="97300"/>
+            <a:off x="9366188" y="1549069"/>
+            <a:ext cx="1027538" cy="1216596"/>
           </a:xfrm>
           <a:prstGeom prst="straightConnector1">
             <a:avLst/>
@@ -3366,15 +3361,15 @@
           </p:cNvPr>
           <p:cNvCxnSpPr>
             <a:cxnSpLocks/>
-            <a:stCxn id="4" idx="2"/>
-            <a:endCxn id="141" idx="0"/>
+            <a:stCxn id="4" idx="3"/>
+            <a:endCxn id="107" idx="1"/>
           </p:cNvCxnSpPr>
           <p:nvPr/>
         </p:nvCxnSpPr>
         <p:spPr>
           <a:xfrm>
-            <a:off x="8350258" y="1907440"/>
-            <a:ext cx="2440524" cy="710504"/>
+            <a:off x="7448250" y="1198156"/>
+            <a:ext cx="647063" cy="18978"/>
           </a:xfrm>
           <a:prstGeom prst="straightConnector1">
             <a:avLst/>
@@ -3421,8 +3416,8 @@
         </p:nvCxnSpPr>
         <p:spPr>
           <a:xfrm flipH="1">
-            <a:off x="7788096" y="1907440"/>
-            <a:ext cx="562163" cy="420232"/>
+            <a:off x="5141810" y="1655355"/>
+            <a:ext cx="271287" cy="394240"/>
           </a:xfrm>
           <a:prstGeom prst="straightConnector1">
             <a:avLst/>
@@ -3464,7 +3459,7 @@
         </p:nvSpPr>
         <p:spPr>
           <a:xfrm>
-            <a:off x="6876002" y="2327672"/>
+            <a:off x="4229716" y="2049595"/>
             <a:ext cx="1824187" cy="369332"/>
           </a:xfrm>
           <a:prstGeom prst="rect">
@@ -3500,7 +3495,7 @@
         </p:nvSpPr>
         <p:spPr>
           <a:xfrm>
-            <a:off x="4004666" y="2159228"/>
+            <a:off x="6196295" y="3638581"/>
             <a:ext cx="1967318" cy="369332"/>
           </a:xfrm>
           <a:prstGeom prst="rect">
@@ -3533,15 +3528,15 @@
           </p:cNvPr>
           <p:cNvCxnSpPr>
             <a:cxnSpLocks/>
-            <a:stCxn id="15" idx="2"/>
-            <a:endCxn id="77" idx="0"/>
+            <a:stCxn id="15" idx="1"/>
+            <a:endCxn id="77" idx="3"/>
           </p:cNvCxnSpPr>
           <p:nvPr/>
         </p:nvCxnSpPr>
         <p:spPr>
-          <a:xfrm>
-            <a:off x="4693093" y="1574196"/>
-            <a:ext cx="295232" cy="585032"/>
+          <a:xfrm flipH="1">
+            <a:off x="8163613" y="3222865"/>
+            <a:ext cx="900493" cy="600382"/>
           </a:xfrm>
           <a:prstGeom prst="straightConnector1">
             <a:avLst/>
@@ -3587,8 +3582,8 @@
         </p:nvCxnSpPr>
         <p:spPr>
           <a:xfrm>
-            <a:off x="1582563" y="1537462"/>
-            <a:ext cx="15527" cy="460551"/>
+            <a:off x="1241959" y="1277948"/>
+            <a:ext cx="157605" cy="1106964"/>
           </a:xfrm>
           <a:prstGeom prst="straightConnector1">
             <a:avLst/>
@@ -3634,8 +3629,8 @@
         </p:nvCxnSpPr>
         <p:spPr>
           <a:xfrm flipH="1">
-            <a:off x="1495479" y="2335885"/>
-            <a:ext cx="102611" cy="702291"/>
+            <a:off x="1177934" y="2722784"/>
+            <a:ext cx="221630" cy="460612"/>
           </a:xfrm>
           <a:prstGeom prst="straightConnector1">
             <a:avLst/>
@@ -3678,8 +3673,8 @@
         </p:nvSpPr>
         <p:spPr>
           <a:xfrm>
-            <a:off x="1934785" y="2577510"/>
-            <a:ext cx="2234259" cy="369332"/>
+            <a:off x="1922606" y="2779965"/>
+            <a:ext cx="1650226" cy="646331"/>
           </a:xfrm>
           <a:prstGeom prst="rect">
             <a:avLst/>
@@ -3723,7 +3718,7 @@
         </p:nvCxnSpPr>
         <p:spPr>
           <a:xfrm>
-            <a:off x="10576460" y="1354909"/>
+            <a:off x="10001968" y="11304673"/>
             <a:ext cx="1146886" cy="31850"/>
           </a:xfrm>
           <a:prstGeom prst="straightConnector1">
@@ -3769,7 +3764,7 @@
         </p:nvCxnSpPr>
         <p:spPr>
           <a:xfrm>
-            <a:off x="10719454" y="909169"/>
+            <a:off x="10144963" y="10858934"/>
             <a:ext cx="860899" cy="5799"/>
           </a:xfrm>
           <a:prstGeom prst="straightConnector1">
@@ -3812,7 +3807,7 @@
         </p:nvSpPr>
         <p:spPr>
           <a:xfrm>
-            <a:off x="10844335" y="489193"/>
+            <a:off x="10269843" y="10438957"/>
             <a:ext cx="485518" cy="369332"/>
           </a:xfrm>
           <a:prstGeom prst="rect">
@@ -3847,7 +3842,7 @@
         </p:nvSpPr>
         <p:spPr>
           <a:xfrm>
-            <a:off x="10907143" y="1035822"/>
+            <a:off x="10332651" y="10985586"/>
             <a:ext cx="455574" cy="369332"/>
           </a:xfrm>
           <a:prstGeom prst="rect">
@@ -3882,7 +3877,7 @@
         </p:nvSpPr>
         <p:spPr>
           <a:xfrm>
-            <a:off x="6503195" y="9238525"/>
+            <a:off x="7264397" y="11012777"/>
             <a:ext cx="1655303" cy="646331"/>
           </a:xfrm>
           <a:prstGeom prst="rect">
@@ -3922,8 +3917,8 @@
         </p:nvCxnSpPr>
         <p:spPr>
           <a:xfrm>
-            <a:off x="7264397" y="5193251"/>
-            <a:ext cx="66450" cy="4045274"/>
+            <a:off x="7348314" y="5711184"/>
+            <a:ext cx="743735" cy="5301593"/>
           </a:xfrm>
           <a:prstGeom prst="straightConnector1">
             <a:avLst/>
@@ -3966,8 +3961,8 @@
         </p:nvSpPr>
         <p:spPr>
           <a:xfrm>
-            <a:off x="209281" y="3038176"/>
-            <a:ext cx="2572396" cy="369332"/>
+            <a:off x="186774" y="3183397"/>
+            <a:ext cx="1982320" cy="646331"/>
           </a:xfrm>
           <a:prstGeom prst="rect">
             <a:avLst/>
@@ -3995,65 +3990,6 @@
           </a:p>
         </p:txBody>
       </p:sp>
-      <p:sp>
-        <p:nvSpPr>
-          <p:cNvPr id="141" name="Rectangle 140">
-            <a:extLst>
-              <a:ext uri="{FF2B5EF4-FFF2-40B4-BE49-F238E27FC236}">
-                <a16:creationId xmlns:a16="http://schemas.microsoft.com/office/drawing/2014/main" id="{C248AEF4-E77C-465F-9EF6-1B5AE3F896D4}"/>
-              </a:ext>
-            </a:extLst>
-          </p:cNvPr>
-          <p:cNvSpPr/>
-          <p:nvPr/>
-        </p:nvSpPr>
-        <p:spPr>
-          <a:xfrm>
-            <a:off x="9894234" y="2617944"/>
-            <a:ext cx="1793097" cy="1209796"/>
-          </a:xfrm>
-          <a:prstGeom prst="rect">
-            <a:avLst/>
-          </a:prstGeom>
-          <a:solidFill>
-            <a:schemeClr val="accent3">
-              <a:lumMod val="40000"/>
-              <a:lumOff val="60000"/>
-            </a:schemeClr>
-          </a:solidFill>
-        </p:spPr>
-        <p:style>
-          <a:lnRef idx="2">
-            <a:schemeClr val="accent1">
-              <a:shade val="50000"/>
-            </a:schemeClr>
-          </a:lnRef>
-          <a:fillRef idx="1">
-            <a:schemeClr val="accent1"/>
-          </a:fillRef>
-          <a:effectRef idx="0">
-            <a:schemeClr val="accent1"/>
-          </a:effectRef>
-          <a:fontRef idx="minor">
-            <a:schemeClr val="lt1"/>
-          </a:fontRef>
-        </p:style>
-        <p:txBody>
-          <a:bodyPr rtlCol="0" anchor="ctr"/>
-          <a:lstStyle/>
-          <a:p>
-            <a:pPr algn="ctr"/>
-            <a:r>
-              <a:rPr lang="en-US" dirty="0">
-                <a:solidFill>
-                  <a:schemeClr val="tx1"/>
-                </a:solidFill>
-              </a:rPr>
-              <a:t>Composition dominated by hydrocarbon molecules</a:t>
-            </a:r>
-          </a:p>
-        </p:txBody>
-      </p:sp>
       <p:cxnSp>
         <p:nvCxnSpPr>
           <p:cNvPr id="143" name="Straight Arrow Connector 142">
@@ -4065,15 +4001,15 @@
           </p:cNvPr>
           <p:cNvCxnSpPr>
             <a:cxnSpLocks/>
-            <a:stCxn id="141" idx="1"/>
-            <a:endCxn id="147" idx="3"/>
+            <a:stCxn id="107" idx="2"/>
+            <a:endCxn id="123" idx="0"/>
           </p:cNvCxnSpPr>
           <p:nvPr/>
         </p:nvCxnSpPr>
         <p:spPr>
           <a:xfrm flipH="1">
-            <a:off x="9410323" y="3222842"/>
-            <a:ext cx="483910" cy="68178"/>
+            <a:off x="7179955" y="1549069"/>
+            <a:ext cx="2186233" cy="1223278"/>
           </a:xfrm>
           <a:prstGeom prst="straightConnector1">
             <a:avLst/>
@@ -4101,42 +4037,6 @@
           </a:fontRef>
         </p:style>
       </p:cxnSp>
-      <p:sp>
-        <p:nvSpPr>
-          <p:cNvPr id="147" name="TextBox 146">
-            <a:extLst>
-              <a:ext uri="{FF2B5EF4-FFF2-40B4-BE49-F238E27FC236}">
-                <a16:creationId xmlns:a16="http://schemas.microsoft.com/office/drawing/2014/main" id="{961055C1-5834-48FC-8AAF-2B19ADF5A8C3}"/>
-              </a:ext>
-            </a:extLst>
-          </p:cNvPr>
-          <p:cNvSpPr txBox="1"/>
-          <p:nvPr/>
-        </p:nvSpPr>
-        <p:spPr>
-          <a:xfrm>
-            <a:off x="7153189" y="3106354"/>
-            <a:ext cx="2257134" cy="369332"/>
-          </a:xfrm>
-          <a:prstGeom prst="rect">
-            <a:avLst/>
-          </a:prstGeom>
-          <a:noFill/>
-        </p:spPr>
-        <p:txBody>
-          <a:bodyPr wrap="square" rtlCol="0">
-            <a:spAutoFit/>
-          </a:bodyPr>
-          <a:lstStyle/>
-          <a:p>
-            <a:pPr algn="ctr"/>
-            <a:r>
-              <a:rPr lang="en-US" b="1" dirty="0"/>
-              <a:t>Hydrocarbon material</a:t>
-            </a:r>
-          </a:p>
-        </p:txBody>
-      </p:sp>
       <p:cxnSp>
         <p:nvCxnSpPr>
           <p:cNvPr id="149" name="Straight Arrow Connector 148">
@@ -4148,15 +4048,15 @@
           </p:cNvPr>
           <p:cNvCxnSpPr>
             <a:cxnSpLocks/>
-            <a:stCxn id="141" idx="2"/>
+            <a:stCxn id="15" idx="2"/>
             <a:endCxn id="153" idx="0"/>
           </p:cNvCxnSpPr>
           <p:nvPr/>
         </p:nvCxnSpPr>
         <p:spPr>
           <a:xfrm flipH="1">
-            <a:off x="9721012" y="3827740"/>
-            <a:ext cx="1069771" cy="885295"/>
+            <a:off x="10319560" y="3680064"/>
+            <a:ext cx="74166" cy="1216596"/>
           </a:xfrm>
           <a:prstGeom prst="straightConnector1">
             <a:avLst/>
@@ -4199,7 +4099,7 @@
         </p:nvSpPr>
         <p:spPr>
           <a:xfrm>
-            <a:off x="9243009" y="4713035"/>
+            <a:off x="9841557" y="4896660"/>
             <a:ext cx="956005" cy="471875"/>
           </a:xfrm>
           <a:prstGeom prst="rect">
@@ -4240,7 +4140,7 @@
                 </a:solidFill>
                 <a:latin typeface="Segoe UI" panose="020B0502040204020203" pitchFamily="34" charset="0"/>
               </a:rPr>
-              <a:t>Is Fluid</a:t>
+              <a:t>Is fluid</a:t>
             </a:r>
             <a:endParaRPr lang="en-US" dirty="0">
               <a:solidFill>
@@ -4267,9 +4167,9 @@
           <p:nvPr/>
         </p:nvCxnSpPr>
         <p:spPr>
-          <a:xfrm>
-            <a:off x="9721012" y="5184910"/>
-            <a:ext cx="1" cy="836356"/>
+          <a:xfrm flipH="1">
+            <a:off x="10178265" y="5368535"/>
+            <a:ext cx="141295" cy="790564"/>
           </a:xfrm>
           <a:prstGeom prst="straightConnector1">
             <a:avLst/>
@@ -4315,8 +4215,8 @@
         </p:nvCxnSpPr>
         <p:spPr>
           <a:xfrm flipH="1">
-            <a:off x="7742399" y="4948973"/>
-            <a:ext cx="1500610" cy="8341"/>
+            <a:off x="7826316" y="5132598"/>
+            <a:ext cx="2015241" cy="342649"/>
           </a:xfrm>
           <a:prstGeom prst="straightConnector1">
             <a:avLst/>
@@ -4359,7 +4259,7 @@
         </p:nvSpPr>
         <p:spPr>
           <a:xfrm>
-            <a:off x="6786394" y="4721376"/>
+            <a:off x="6870311" y="5239309"/>
             <a:ext cx="956005" cy="471875"/>
           </a:xfrm>
           <a:prstGeom prst="rect">
@@ -4424,7 +4324,7 @@
         </p:nvSpPr>
         <p:spPr>
           <a:xfrm>
-            <a:off x="9243010" y="6021266"/>
+            <a:off x="9700262" y="6159099"/>
             <a:ext cx="956005" cy="471875"/>
           </a:xfrm>
           <a:prstGeom prst="rect">
@@ -4489,7 +4389,7 @@
         </p:nvSpPr>
         <p:spPr>
           <a:xfrm>
-            <a:off x="8823312" y="7190133"/>
+            <a:off x="8963891" y="7571584"/>
             <a:ext cx="1837937" cy="623223"/>
           </a:xfrm>
           <a:prstGeom prst="rect">
@@ -4557,9 +4457,9 @@
           <p:nvPr/>
         </p:nvCxnSpPr>
         <p:spPr>
-          <a:xfrm>
-            <a:off x="9721013" y="6493141"/>
-            <a:ext cx="21268" cy="696992"/>
+          <a:xfrm flipH="1">
+            <a:off x="9882860" y="6630974"/>
+            <a:ext cx="295405" cy="940610"/>
           </a:xfrm>
           <a:prstGeom prst="straightConnector1">
             <a:avLst/>
@@ -4600,14 +4500,14 @@
           <p:cNvCxnSpPr>
             <a:cxnSpLocks/>
             <a:stCxn id="170" idx="2"/>
-            <a:endCxn id="178" idx="1"/>
+            <a:endCxn id="178" idx="0"/>
           </p:cNvCxnSpPr>
           <p:nvPr/>
         </p:nvCxnSpPr>
         <p:spPr>
           <a:xfrm>
-            <a:off x="9742281" y="7813356"/>
-            <a:ext cx="541867" cy="951408"/>
+            <a:off x="9882860" y="8194807"/>
+            <a:ext cx="872501" cy="1245162"/>
           </a:xfrm>
           <a:prstGeom prst="straightConnector1">
             <a:avLst/>
@@ -4650,7 +4550,7 @@
         </p:nvSpPr>
         <p:spPr>
           <a:xfrm>
-            <a:off x="10284148" y="8441598"/>
+            <a:off x="9965240" y="9439969"/>
             <a:ext cx="1580241" cy="646331"/>
           </a:xfrm>
           <a:prstGeom prst="rect">
@@ -4686,7 +4586,7 @@
         </p:nvSpPr>
         <p:spPr>
           <a:xfrm>
-            <a:off x="7781723" y="5981672"/>
+            <a:off x="8006312" y="6307808"/>
             <a:ext cx="1094725" cy="646331"/>
           </a:xfrm>
           <a:prstGeom prst="rect">
@@ -4722,7 +4622,7 @@
         </p:nvSpPr>
         <p:spPr>
           <a:xfrm>
-            <a:off x="8350258" y="8662181"/>
+            <a:off x="8449534" y="9618064"/>
             <a:ext cx="1392023" cy="369332"/>
           </a:xfrm>
           <a:prstGeom prst="rect">
@@ -4762,8 +4662,8 @@
         </p:nvCxnSpPr>
         <p:spPr>
           <a:xfrm flipH="1">
-            <a:off x="8876448" y="6257204"/>
-            <a:ext cx="366562" cy="47634"/>
+            <a:off x="9101037" y="6395037"/>
+            <a:ext cx="599225" cy="235937"/>
           </a:xfrm>
           <a:prstGeom prst="straightConnector1">
             <a:avLst/>
@@ -4809,8 +4709,8 @@
         </p:nvCxnSpPr>
         <p:spPr>
           <a:xfrm flipH="1">
-            <a:off x="9046270" y="7813356"/>
-            <a:ext cx="696011" cy="848825"/>
+            <a:off x="9145546" y="8194807"/>
+            <a:ext cx="737314" cy="1423257"/>
           </a:xfrm>
           <a:prstGeom prst="straightConnector1">
             <a:avLst/>
@@ -4852,7 +4752,7 @@
         </p:nvSpPr>
         <p:spPr>
           <a:xfrm>
-            <a:off x="5546446" y="4197015"/>
+            <a:off x="523295" y="4624685"/>
             <a:ext cx="608118" cy="369332"/>
           </a:xfrm>
           <a:prstGeom prst="rect">
@@ -4888,7 +4788,7 @@
         </p:nvSpPr>
         <p:spPr>
           <a:xfrm>
-            <a:off x="5288222" y="8436787"/>
+            <a:off x="219868" y="10038977"/>
             <a:ext cx="1214973" cy="369332"/>
           </a:xfrm>
           <a:prstGeom prst="rect">
@@ -4924,7 +4824,7 @@
         </p:nvSpPr>
         <p:spPr>
           <a:xfrm>
-            <a:off x="5574205" y="6193655"/>
+            <a:off x="505851" y="6807420"/>
             <a:ext cx="643006" cy="369332"/>
           </a:xfrm>
           <a:prstGeom prst="rect">
@@ -4960,7 +4860,7 @@
         </p:nvSpPr>
         <p:spPr>
           <a:xfrm>
-            <a:off x="5350153" y="5193251"/>
+            <a:off x="281800" y="5787435"/>
             <a:ext cx="1091109" cy="369332"/>
           </a:xfrm>
           <a:prstGeom prst="rect">
@@ -4996,7 +4896,7 @@
         </p:nvSpPr>
         <p:spPr>
           <a:xfrm>
-            <a:off x="5350154" y="7311883"/>
+            <a:off x="281800" y="8862557"/>
             <a:ext cx="1091108" cy="369332"/>
           </a:xfrm>
           <a:prstGeom prst="rect">
@@ -5032,8 +4932,8 @@
         </p:nvSpPr>
         <p:spPr>
           <a:xfrm>
-            <a:off x="264610" y="3959146"/>
-            <a:ext cx="4554045" cy="845070"/>
+            <a:off x="1862682" y="4401018"/>
+            <a:ext cx="4070307" cy="845070"/>
           </a:xfrm>
           <a:prstGeom prst="rect">
             <a:avLst/>
@@ -5090,8 +4990,8 @@
         </p:nvSpPr>
         <p:spPr>
           <a:xfrm>
-            <a:off x="253737" y="5059882"/>
-            <a:ext cx="4554045" cy="646331"/>
+            <a:off x="2133475" y="5655163"/>
+            <a:ext cx="3544931" cy="646331"/>
           </a:xfrm>
           <a:prstGeom prst="rect">
             <a:avLst/>
@@ -5148,8 +5048,8 @@
         </p:nvSpPr>
         <p:spPr>
           <a:xfrm>
-            <a:off x="234055" y="5961879"/>
-            <a:ext cx="4554045" cy="856469"/>
+            <a:off x="2117306" y="6576443"/>
+            <a:ext cx="4365269" cy="856469"/>
           </a:xfrm>
           <a:prstGeom prst="rect">
             <a:avLst/>
@@ -5206,7 +5106,7 @@
         </p:nvSpPr>
         <p:spPr>
           <a:xfrm>
-            <a:off x="231551" y="7074014"/>
+            <a:off x="2362347" y="8617929"/>
             <a:ext cx="4554045" cy="856469"/>
           </a:xfrm>
           <a:prstGeom prst="rect">
@@ -5264,7 +5164,7 @@
         </p:nvSpPr>
         <p:spPr>
           <a:xfrm>
-            <a:off x="231551" y="8186147"/>
+            <a:off x="2362347" y="9796901"/>
             <a:ext cx="4554045" cy="856469"/>
           </a:xfrm>
           <a:prstGeom prst="rect">
@@ -5303,7 +5203,7 @@
                   <a:schemeClr val="tx1"/>
                 </a:solidFill>
               </a:rPr>
-              <a:t>consists of microscopic particulate material derived by precipitation, filtering, or settling from suspension in a fluid</a:t>
+              <a:t>consists of microscopic to tiny particulate material derived by precipitation, filtering, or settling from suspension in a fluid</a:t>
             </a:r>
           </a:p>
         </p:txBody>
@@ -5319,15 +5219,15 @@
           </p:cNvPr>
           <p:cNvCxnSpPr>
             <a:cxnSpLocks/>
-            <a:stCxn id="241" idx="3"/>
-            <a:endCxn id="234" idx="1"/>
+            <a:stCxn id="241" idx="1"/>
+            <a:endCxn id="234" idx="3"/>
           </p:cNvCxnSpPr>
           <p:nvPr/>
         </p:nvCxnSpPr>
         <p:spPr>
-          <a:xfrm>
-            <a:off x="4818655" y="4381681"/>
-            <a:ext cx="727791" cy="0"/>
+          <a:xfrm flipH="1" flipV="1">
+            <a:off x="1131413" y="4809351"/>
+            <a:ext cx="731269" cy="14202"/>
           </a:xfrm>
           <a:prstGeom prst="straightConnector1">
             <a:avLst/>
@@ -5366,15 +5266,15 @@
           </p:cNvPr>
           <p:cNvCxnSpPr>
             <a:cxnSpLocks/>
-            <a:stCxn id="242" idx="3"/>
-            <a:endCxn id="237" idx="1"/>
+            <a:stCxn id="242" idx="1"/>
+            <a:endCxn id="237" idx="3"/>
           </p:cNvCxnSpPr>
           <p:nvPr/>
         </p:nvCxnSpPr>
         <p:spPr>
-          <a:xfrm flipV="1">
-            <a:off x="4807782" y="5377917"/>
-            <a:ext cx="542371" cy="5131"/>
+          <a:xfrm flipH="1" flipV="1">
+            <a:off x="1372909" y="5972101"/>
+            <a:ext cx="760566" cy="6228"/>
           </a:xfrm>
           <a:prstGeom prst="straightConnector1">
             <a:avLst/>
@@ -5413,15 +5313,15 @@
           </p:cNvPr>
           <p:cNvCxnSpPr>
             <a:cxnSpLocks/>
-            <a:stCxn id="243" idx="3"/>
-            <a:endCxn id="236" idx="1"/>
+            <a:stCxn id="243" idx="1"/>
+            <a:endCxn id="236" idx="3"/>
           </p:cNvCxnSpPr>
           <p:nvPr/>
         </p:nvCxnSpPr>
         <p:spPr>
-          <a:xfrm flipV="1">
-            <a:off x="4788100" y="6378321"/>
-            <a:ext cx="786105" cy="11793"/>
+          <a:xfrm flipH="1" flipV="1">
+            <a:off x="1148857" y="6992086"/>
+            <a:ext cx="968449" cy="12592"/>
           </a:xfrm>
           <a:prstGeom prst="straightConnector1">
             <a:avLst/>
@@ -5460,15 +5360,15 @@
           </p:cNvPr>
           <p:cNvCxnSpPr>
             <a:cxnSpLocks/>
-            <a:stCxn id="244" idx="3"/>
-            <a:endCxn id="238" idx="1"/>
+            <a:stCxn id="244" idx="1"/>
+            <a:endCxn id="238" idx="3"/>
           </p:cNvCxnSpPr>
           <p:nvPr/>
         </p:nvCxnSpPr>
         <p:spPr>
-          <a:xfrm flipV="1">
-            <a:off x="4785596" y="7496549"/>
-            <a:ext cx="564558" cy="5700"/>
+          <a:xfrm flipH="1">
+            <a:off x="1372908" y="9046164"/>
+            <a:ext cx="989439" cy="1059"/>
           </a:xfrm>
           <a:prstGeom prst="straightConnector1">
             <a:avLst/>
@@ -5507,15 +5407,15 @@
           </p:cNvPr>
           <p:cNvCxnSpPr>
             <a:cxnSpLocks/>
-            <a:stCxn id="245" idx="3"/>
-            <a:endCxn id="235" idx="1"/>
+            <a:stCxn id="245" idx="1"/>
+            <a:endCxn id="235" idx="3"/>
           </p:cNvCxnSpPr>
           <p:nvPr/>
         </p:nvCxnSpPr>
         <p:spPr>
-          <a:xfrm>
-            <a:off x="4785596" y="8614382"/>
-            <a:ext cx="502626" cy="7071"/>
+          <a:xfrm flipH="1" flipV="1">
+            <a:off x="1434841" y="10223643"/>
+            <a:ext cx="927506" cy="1493"/>
           </a:xfrm>
           <a:prstGeom prst="straightConnector1">
             <a:avLst/>
@@ -5561,8 +5461,8 @@
         </p:nvCxnSpPr>
         <p:spPr>
           <a:xfrm rot="16200000" flipH="1">
-            <a:off x="4246347" y="7304842"/>
-            <a:ext cx="519075" cy="3994621"/>
+            <a:off x="5610597" y="9682142"/>
+            <a:ext cx="682573" cy="2625027"/>
           </a:xfrm>
           <a:prstGeom prst="curvedConnector2">
             <a:avLst/>
@@ -5603,19 +5503,18 @@
           <p:cNvCxnSpPr>
             <a:cxnSpLocks/>
             <a:stCxn id="164" idx="1"/>
-            <a:endCxn id="241" idx="0"/>
+            <a:endCxn id="241" idx="3"/>
           </p:cNvCxnSpPr>
           <p:nvPr/>
         </p:nvCxnSpPr>
         <p:spPr>
           <a:xfrm rot="10800000">
-            <a:off x="2541634" y="3959146"/>
-            <a:ext cx="4244761" cy="998168"/>
-          </a:xfrm>
-          <a:prstGeom prst="curvedConnector4">
+            <a:off x="5932989" y="4823553"/>
+            <a:ext cx="937322" cy="651694"/>
+          </a:xfrm>
+          <a:prstGeom prst="curvedConnector3">
             <a:avLst>
-              <a:gd name="adj1" fmla="val 7478"/>
-              <a:gd name="adj2" fmla="val 171035"/>
+              <a:gd name="adj1" fmla="val 50000"/>
             </a:avLst>
           </a:prstGeom>
           <a:ln w="57150">
@@ -5658,9 +5557,9 @@
           <p:nvPr/>
         </p:nvCxnSpPr>
         <p:spPr>
-          <a:xfrm flipH="1">
-            <a:off x="2530760" y="4804216"/>
-            <a:ext cx="10873" cy="255666"/>
+          <a:xfrm>
+            <a:off x="3897836" y="5246088"/>
+            <a:ext cx="8105" cy="409075"/>
           </a:xfrm>
           <a:prstGeom prst="straightConnector1">
             <a:avLst/>
@@ -5706,9 +5605,9 @@
           <p:nvPr/>
         </p:nvCxnSpPr>
         <p:spPr>
-          <a:xfrm flipH="1">
-            <a:off x="2511078" y="5706213"/>
-            <a:ext cx="19682" cy="255666"/>
+          <a:xfrm>
+            <a:off x="3905941" y="6301494"/>
+            <a:ext cx="394000" cy="274949"/>
           </a:xfrm>
           <a:prstGeom prst="straightConnector1">
             <a:avLst/>
@@ -5749,14 +5648,14 @@
           <p:cNvCxnSpPr>
             <a:cxnSpLocks/>
             <a:stCxn id="243" idx="2"/>
-            <a:endCxn id="244" idx="0"/>
+            <a:endCxn id="102" idx="0"/>
           </p:cNvCxnSpPr>
           <p:nvPr/>
         </p:nvCxnSpPr>
         <p:spPr>
-          <a:xfrm flipH="1">
-            <a:off x="2508574" y="6818348"/>
-            <a:ext cx="2504" cy="255666"/>
+          <a:xfrm>
+            <a:off x="4299941" y="7432912"/>
+            <a:ext cx="138240" cy="370945"/>
           </a:xfrm>
           <a:prstGeom prst="straightConnector1">
             <a:avLst/>
@@ -5803,8 +5702,8 @@
         </p:nvCxnSpPr>
         <p:spPr>
           <a:xfrm>
-            <a:off x="2508574" y="7930483"/>
-            <a:ext cx="0" cy="255664"/>
+            <a:off x="4639370" y="9474398"/>
+            <a:ext cx="0" cy="322503"/>
           </a:xfrm>
           <a:prstGeom prst="straightConnector1">
             <a:avLst/>
@@ -5847,7 +5746,7 @@
         </p:nvSpPr>
         <p:spPr>
           <a:xfrm>
-            <a:off x="146534" y="250719"/>
+            <a:off x="146670" y="78145"/>
             <a:ext cx="1436030" cy="646331"/>
           </a:xfrm>
           <a:prstGeom prst="rect">
@@ -5872,6 +5771,490 @@
             <a:r>
               <a:rPr lang="en-US" sz="3600" dirty="0"/>
               <a:t>START</a:t>
+            </a:r>
+          </a:p>
+        </p:txBody>
+      </p:sp>
+      <p:sp>
+        <p:nvSpPr>
+          <p:cNvPr id="10" name="TextBox 9">
+            <a:extLst>
+              <a:ext uri="{FF2B5EF4-FFF2-40B4-BE49-F238E27FC236}">
+                <a16:creationId xmlns:a16="http://schemas.microsoft.com/office/drawing/2014/main" id="{BE45C804-8EFA-4F5A-8E58-43A2638108F0}"/>
+              </a:ext>
+            </a:extLst>
+          </p:cNvPr>
+          <p:cNvSpPr txBox="1"/>
+          <p:nvPr/>
+        </p:nvSpPr>
+        <p:spPr>
+          <a:xfrm>
+            <a:off x="10419479" y="1908746"/>
+            <a:ext cx="1826893" cy="861774"/>
+          </a:xfrm>
+          <a:prstGeom prst="rect">
+            <a:avLst/>
+          </a:prstGeom>
+          <a:noFill/>
+        </p:spPr>
+        <p:txBody>
+          <a:bodyPr wrap="square" rtlCol="0">
+            <a:spAutoFit/>
+          </a:bodyPr>
+          <a:lstStyle/>
+          <a:p>
+            <a:r>
+              <a:rPr lang="en-US" sz="1000" dirty="0">
+                <a:latin typeface="Arial" panose="020B0604020202020204" pitchFamily="34" charset="0"/>
+                <a:cs typeface="Arial" panose="020B0604020202020204" pitchFamily="34" charset="0"/>
+              </a:rPr>
+              <a:t>The media can be of very different nature. They can be a gas, a liquid or a solid. E.g. aerosol, foam, emulsion, colloidal suspension.</a:t>
+            </a:r>
+          </a:p>
+        </p:txBody>
+      </p:sp>
+      <p:sp>
+        <p:nvSpPr>
+          <p:cNvPr id="70" name="TextBox 69">
+            <a:extLst>
+              <a:ext uri="{FF2B5EF4-FFF2-40B4-BE49-F238E27FC236}">
+                <a16:creationId xmlns:a16="http://schemas.microsoft.com/office/drawing/2014/main" id="{4E4319EA-965D-4B10-91A0-8F780CA8F693}"/>
+              </a:ext>
+            </a:extLst>
+          </p:cNvPr>
+          <p:cNvSpPr txBox="1"/>
+          <p:nvPr/>
+        </p:nvSpPr>
+        <p:spPr>
+          <a:xfrm>
+            <a:off x="1215217" y="11731250"/>
+            <a:ext cx="10427072" cy="646331"/>
+          </a:xfrm>
+          <a:prstGeom prst="rect">
+            <a:avLst/>
+          </a:prstGeom>
+          <a:noFill/>
+        </p:spPr>
+        <p:txBody>
+          <a:bodyPr wrap="square" rtlCol="0">
+            <a:spAutoFit/>
+          </a:bodyPr>
+          <a:lstStyle>
+            <a:defPPr>
+              <a:defRPr lang="en-US"/>
+            </a:defPPr>
+            <a:lvl1pPr>
+              <a:defRPr b="1"/>
+            </a:lvl1pPr>
+          </a:lstStyle>
+          <a:p>
+            <a:pPr algn="ctr"/>
+            <a:r>
+              <a:rPr lang="en-US" sz="3600" dirty="0" err="1"/>
+              <a:t>iSamples</a:t>
+            </a:r>
+            <a:r>
+              <a:rPr lang="en-US" sz="3600" dirty="0"/>
+              <a:t> Material Type Decision Tree</a:t>
+            </a:r>
+          </a:p>
+        </p:txBody>
+      </p:sp>
+      <p:sp>
+        <p:nvSpPr>
+          <p:cNvPr id="88" name="TextBox 87">
+            <a:extLst>
+              <a:ext uri="{FF2B5EF4-FFF2-40B4-BE49-F238E27FC236}">
+                <a16:creationId xmlns:a16="http://schemas.microsoft.com/office/drawing/2014/main" id="{4B416E4A-019D-4D1A-BE4F-3BF2948BF04A}"/>
+              </a:ext>
+            </a:extLst>
+          </p:cNvPr>
+          <p:cNvSpPr txBox="1"/>
+          <p:nvPr/>
+        </p:nvSpPr>
+        <p:spPr>
+          <a:xfrm>
+            <a:off x="1441347" y="1845559"/>
+            <a:ext cx="2215952" cy="553998"/>
+          </a:xfrm>
+          <a:prstGeom prst="rect">
+            <a:avLst/>
+          </a:prstGeom>
+          <a:noFill/>
+        </p:spPr>
+        <p:txBody>
+          <a:bodyPr wrap="square" rtlCol="0">
+            <a:spAutoFit/>
+          </a:bodyPr>
+          <a:lstStyle/>
+          <a:p>
+            <a:r>
+              <a:rPr lang="en-US" sz="1000" dirty="0">
+                <a:latin typeface="Arial" panose="020B0604020202020204" pitchFamily="34" charset="0"/>
+                <a:cs typeface="Arial" panose="020B0604020202020204" pitchFamily="34" charset="0"/>
+              </a:rPr>
+              <a:t>Sample is composed of material that is human-manufactured, e.g. glass, cement, plaster, refined metal</a:t>
+            </a:r>
+          </a:p>
+        </p:txBody>
+      </p:sp>
+      <p:sp>
+        <p:nvSpPr>
+          <p:cNvPr id="96" name="TextBox 95">
+            <a:extLst>
+              <a:ext uri="{FF2B5EF4-FFF2-40B4-BE49-F238E27FC236}">
+                <a16:creationId xmlns:a16="http://schemas.microsoft.com/office/drawing/2014/main" id="{99AACC5C-BCDA-4866-861D-08B5365FF12B}"/>
+              </a:ext>
+            </a:extLst>
+          </p:cNvPr>
+          <p:cNvSpPr txBox="1"/>
+          <p:nvPr/>
+        </p:nvSpPr>
+        <p:spPr>
+          <a:xfrm>
+            <a:off x="6845028" y="4413982"/>
+            <a:ext cx="1557413" cy="553998"/>
+          </a:xfrm>
+          <a:prstGeom prst="rect">
+            <a:avLst/>
+          </a:prstGeom>
+          <a:noFill/>
+        </p:spPr>
+        <p:txBody>
+          <a:bodyPr wrap="square" rtlCol="0">
+            <a:spAutoFit/>
+          </a:bodyPr>
+          <a:lstStyle/>
+          <a:p>
+            <a:r>
+              <a:rPr lang="en-US" sz="1000" dirty="0">
+                <a:latin typeface="Arial" panose="020B0604020202020204" pitchFamily="34" charset="0"/>
+                <a:cs typeface="Arial" panose="020B0604020202020204" pitchFamily="34" charset="0"/>
+              </a:rPr>
+              <a:t>Material is a solid, or an aggregate of solid, differentiable particles</a:t>
+            </a:r>
+          </a:p>
+        </p:txBody>
+      </p:sp>
+      <p:sp>
+        <p:nvSpPr>
+          <p:cNvPr id="102" name="Rectangle 101">
+            <a:extLst>
+              <a:ext uri="{FF2B5EF4-FFF2-40B4-BE49-F238E27FC236}">
+                <a16:creationId xmlns:a16="http://schemas.microsoft.com/office/drawing/2014/main" id="{E615F930-8BB4-496F-8469-9E282874ED59}"/>
+              </a:ext>
+            </a:extLst>
+          </p:cNvPr>
+          <p:cNvSpPr/>
+          <p:nvPr/>
+        </p:nvSpPr>
+        <p:spPr>
+          <a:xfrm>
+            <a:off x="2484464" y="7803857"/>
+            <a:ext cx="3907434" cy="471875"/>
+          </a:xfrm>
+          <a:prstGeom prst="rect">
+            <a:avLst/>
+          </a:prstGeom>
+          <a:solidFill>
+            <a:schemeClr val="accent3">
+              <a:lumMod val="40000"/>
+              <a:lumOff val="60000"/>
+            </a:schemeClr>
+          </a:solidFill>
+        </p:spPr>
+        <p:style>
+          <a:lnRef idx="2">
+            <a:schemeClr val="accent1">
+              <a:shade val="50000"/>
+            </a:schemeClr>
+          </a:lnRef>
+          <a:fillRef idx="1">
+            <a:schemeClr val="accent1"/>
+          </a:fillRef>
+          <a:effectRef idx="0">
+            <a:schemeClr val="accent1"/>
+          </a:effectRef>
+          <a:fontRef idx="minor">
+            <a:schemeClr val="lt1"/>
+          </a:fontRef>
+        </p:style>
+        <p:txBody>
+          <a:bodyPr rtlCol="0" anchor="ctr"/>
+          <a:lstStyle/>
+          <a:p>
+            <a:pPr algn="ctr"/>
+            <a:r>
+              <a:rPr lang="en-US" dirty="0">
+                <a:solidFill>
+                  <a:schemeClr val="tx1"/>
+                </a:solidFill>
+              </a:rPr>
+              <a:t>Undifferentiated soil, sediment or rock</a:t>
+            </a:r>
+          </a:p>
+        </p:txBody>
+      </p:sp>
+      <p:cxnSp>
+        <p:nvCxnSpPr>
+          <p:cNvPr id="103" name="Straight Arrow Connector 102">
+            <a:extLst>
+              <a:ext uri="{FF2B5EF4-FFF2-40B4-BE49-F238E27FC236}">
+                <a16:creationId xmlns:a16="http://schemas.microsoft.com/office/drawing/2014/main" id="{3629AF44-D70C-43CC-87E9-6B908027FA79}"/>
+              </a:ext>
+            </a:extLst>
+          </p:cNvPr>
+          <p:cNvCxnSpPr>
+            <a:cxnSpLocks/>
+            <a:stCxn id="102" idx="2"/>
+            <a:endCxn id="244" idx="0"/>
+          </p:cNvCxnSpPr>
+          <p:nvPr/>
+        </p:nvCxnSpPr>
+        <p:spPr>
+          <a:xfrm>
+            <a:off x="4438181" y="8275732"/>
+            <a:ext cx="201189" cy="342197"/>
+          </a:xfrm>
+          <a:prstGeom prst="straightConnector1">
+            <a:avLst/>
+          </a:prstGeom>
+          <a:ln w="57150">
+            <a:solidFill>
+              <a:srgbClr val="FF0000"/>
+            </a:solidFill>
+            <a:prstDash val="sysDash"/>
+            <a:headEnd type="none" w="med" len="med"/>
+            <a:tailEnd type="triangle" w="med" len="med"/>
+          </a:ln>
+        </p:spPr>
+        <p:style>
+          <a:lnRef idx="1">
+            <a:schemeClr val="accent1"/>
+          </a:lnRef>
+          <a:fillRef idx="0">
+            <a:schemeClr val="accent1"/>
+          </a:fillRef>
+          <a:effectRef idx="0">
+            <a:schemeClr val="accent1"/>
+          </a:effectRef>
+          <a:fontRef idx="minor">
+            <a:schemeClr val="tx1"/>
+          </a:fontRef>
+        </p:style>
+      </p:cxnSp>
+      <p:sp>
+        <p:nvSpPr>
+          <p:cNvPr id="110" name="TextBox 109">
+            <a:extLst>
+              <a:ext uri="{FF2B5EF4-FFF2-40B4-BE49-F238E27FC236}">
+                <a16:creationId xmlns:a16="http://schemas.microsoft.com/office/drawing/2014/main" id="{09177A55-5D5E-486B-A957-8016461230E8}"/>
+              </a:ext>
+            </a:extLst>
+          </p:cNvPr>
+          <p:cNvSpPr txBox="1"/>
+          <p:nvPr/>
+        </p:nvSpPr>
+        <p:spPr>
+          <a:xfrm>
+            <a:off x="18949" y="7735672"/>
+            <a:ext cx="1616811" cy="646331"/>
+          </a:xfrm>
+          <a:prstGeom prst="rect">
+            <a:avLst/>
+          </a:prstGeom>
+          <a:noFill/>
+        </p:spPr>
+        <p:txBody>
+          <a:bodyPr wrap="square" rtlCol="0">
+            <a:spAutoFit/>
+          </a:bodyPr>
+          <a:lstStyle/>
+          <a:p>
+            <a:pPr algn="ctr"/>
+            <a:r>
+              <a:rPr lang="en-US" b="1" dirty="0"/>
+              <a:t>Mixed soil, sediment, rock</a:t>
+            </a:r>
+          </a:p>
+        </p:txBody>
+      </p:sp>
+      <p:cxnSp>
+        <p:nvCxnSpPr>
+          <p:cNvPr id="111" name="Straight Arrow Connector 110">
+            <a:extLst>
+              <a:ext uri="{FF2B5EF4-FFF2-40B4-BE49-F238E27FC236}">
+                <a16:creationId xmlns:a16="http://schemas.microsoft.com/office/drawing/2014/main" id="{9B428DDE-2B01-4E0A-A865-F0F3B84912C4}"/>
+              </a:ext>
+            </a:extLst>
+          </p:cNvPr>
+          <p:cNvCxnSpPr>
+            <a:cxnSpLocks/>
+            <a:stCxn id="102" idx="1"/>
+            <a:endCxn id="110" idx="3"/>
+          </p:cNvCxnSpPr>
+          <p:nvPr/>
+        </p:nvCxnSpPr>
+        <p:spPr>
+          <a:xfrm flipH="1">
+            <a:off x="1635760" y="8039795"/>
+            <a:ext cx="848704" cy="19043"/>
+          </a:xfrm>
+          <a:prstGeom prst="straightConnector1">
+            <a:avLst/>
+          </a:prstGeom>
+          <a:ln w="57150">
+            <a:solidFill>
+              <a:srgbClr val="00B050"/>
+            </a:solidFill>
+            <a:headEnd type="none" w="med" len="med"/>
+            <a:tailEnd type="triangle" w="med" len="med"/>
+          </a:ln>
+        </p:spPr>
+        <p:style>
+          <a:lnRef idx="1">
+            <a:schemeClr val="accent1"/>
+          </a:lnRef>
+          <a:fillRef idx="0">
+            <a:schemeClr val="accent1"/>
+          </a:fillRef>
+          <a:effectRef idx="0">
+            <a:schemeClr val="accent1"/>
+          </a:effectRef>
+          <a:fontRef idx="minor">
+            <a:schemeClr val="tx1"/>
+          </a:fontRef>
+        </p:style>
+      </p:cxnSp>
+      <p:sp>
+        <p:nvSpPr>
+          <p:cNvPr id="118" name="TextBox 117">
+            <a:extLst>
+              <a:ext uri="{FF2B5EF4-FFF2-40B4-BE49-F238E27FC236}">
+                <a16:creationId xmlns:a16="http://schemas.microsoft.com/office/drawing/2014/main" id="{7B1DC8E7-0D23-4D72-A59F-C1A4D68CD4A7}"/>
+              </a:ext>
+            </a:extLst>
+          </p:cNvPr>
+          <p:cNvSpPr txBox="1"/>
+          <p:nvPr/>
+        </p:nvSpPr>
+        <p:spPr>
+          <a:xfrm>
+            <a:off x="2555356" y="10681494"/>
+            <a:ext cx="2215952" cy="400110"/>
+          </a:xfrm>
+          <a:prstGeom prst="rect">
+            <a:avLst/>
+          </a:prstGeom>
+          <a:noFill/>
+        </p:spPr>
+        <p:txBody>
+          <a:bodyPr wrap="square" rtlCol="0">
+            <a:spAutoFit/>
+          </a:bodyPr>
+          <a:lstStyle/>
+          <a:p>
+            <a:r>
+              <a:rPr lang="en-US" sz="1000" dirty="0">
+                <a:latin typeface="Arial" panose="020B0604020202020204" pitchFamily="34" charset="0"/>
+                <a:cs typeface="Arial" panose="020B0604020202020204" pitchFamily="34" charset="0"/>
+              </a:rPr>
+              <a:t>Human manufactured particulates would be anthropogenic material.</a:t>
+            </a:r>
+          </a:p>
+        </p:txBody>
+      </p:sp>
+      <p:sp>
+        <p:nvSpPr>
+          <p:cNvPr id="107" name="Rectangle 106">
+            <a:extLst>
+              <a:ext uri="{FF2B5EF4-FFF2-40B4-BE49-F238E27FC236}">
+                <a16:creationId xmlns:a16="http://schemas.microsoft.com/office/drawing/2014/main" id="{5F2FC061-8C8D-4622-959D-02BE2F1F21DD}"/>
+              </a:ext>
+            </a:extLst>
+          </p:cNvPr>
+          <p:cNvSpPr/>
+          <p:nvPr/>
+        </p:nvSpPr>
+        <p:spPr>
+          <a:xfrm>
+            <a:off x="8095313" y="885199"/>
+            <a:ext cx="2541749" cy="663870"/>
+          </a:xfrm>
+          <a:prstGeom prst="rect">
+            <a:avLst/>
+          </a:prstGeom>
+          <a:solidFill>
+            <a:schemeClr val="accent3">
+              <a:lumMod val="40000"/>
+              <a:lumOff val="60000"/>
+            </a:schemeClr>
+          </a:solidFill>
+        </p:spPr>
+        <p:style>
+          <a:lnRef idx="2">
+            <a:schemeClr val="accent1">
+              <a:shade val="50000"/>
+            </a:schemeClr>
+          </a:lnRef>
+          <a:fillRef idx="1">
+            <a:schemeClr val="accent1"/>
+          </a:fillRef>
+          <a:effectRef idx="0">
+            <a:schemeClr val="accent1"/>
+          </a:effectRef>
+          <a:fontRef idx="minor">
+            <a:schemeClr val="lt1"/>
+          </a:fontRef>
+        </p:style>
+        <p:txBody>
+          <a:bodyPr rtlCol="0" anchor="ctr"/>
+          <a:lstStyle/>
+          <a:p>
+            <a:pPr algn="ctr"/>
+            <a:r>
+              <a:rPr lang="en-US" dirty="0">
+                <a:solidFill>
+                  <a:schemeClr val="tx1"/>
+                </a:solidFill>
+              </a:rPr>
+              <a:t>Other material produced by living organisms</a:t>
+            </a:r>
+          </a:p>
+        </p:txBody>
+      </p:sp>
+      <p:sp>
+        <p:nvSpPr>
+          <p:cNvPr id="123" name="TextBox 122">
+            <a:extLst>
+              <a:ext uri="{FF2B5EF4-FFF2-40B4-BE49-F238E27FC236}">
+                <a16:creationId xmlns:a16="http://schemas.microsoft.com/office/drawing/2014/main" id="{C1F3DA89-5F4A-4FB8-AA90-06CBB6B2831D}"/>
+              </a:ext>
+            </a:extLst>
+          </p:cNvPr>
+          <p:cNvSpPr txBox="1"/>
+          <p:nvPr/>
+        </p:nvSpPr>
+        <p:spPr>
+          <a:xfrm>
+            <a:off x="6267861" y="2772347"/>
+            <a:ext cx="1824187" cy="646331"/>
+          </a:xfrm>
+          <a:prstGeom prst="rect">
+            <a:avLst/>
+          </a:prstGeom>
+          <a:noFill/>
+        </p:spPr>
+        <p:txBody>
+          <a:bodyPr wrap="square" rtlCol="0">
+            <a:spAutoFit/>
+          </a:bodyPr>
+          <a:lstStyle/>
+          <a:p>
+            <a:pPr algn="ctr"/>
+            <a:r>
+              <a:rPr lang="en-US" b="1" dirty="0"/>
+              <a:t>Biogenic non-organic material</a:t>
             </a:r>
           </a:p>
         </p:txBody>

</xml_diff>